<commit_message>
Ajout d'images dans les slides + Corrections
</commit_message>
<xml_diff>
--- a/schemas.pptx
+++ b/schemas.pptx
@@ -197,7 +197,7 @@
           <a:p>
             <a:fld id="{C5D151DD-1573-4B8B-87DC-CA4975D4E5FB}" type="datetimeFigureOut">
               <a:rPr lang="fr-FR" smtClean="0"/>
-              <a:t>26/11/2013</a:t>
+              <a:t>05/12/2013</a:t>
             </a:fld>
             <a:endParaRPr lang="fr-FR"/>
           </a:p>
@@ -16820,7 +16820,7 @@
               <a:t>-model</a:t>
             </a:r>
             <a:r>
-              <a:rPr lang="en-US" sz="800" dirty="0">
+              <a:rPr lang="en-US" sz="800" dirty="0" smtClean="0">
                 <a:solidFill>
                   <a:srgbClr val="000000"/>
                 </a:solidFill>
@@ -16832,7 +16832,7 @@
               <a:t>=</a:t>
             </a:r>
             <a:r>
-              <a:rPr lang="en-US" sz="800" i="1" dirty="0">
+              <a:rPr lang="en-US" sz="800" i="1" dirty="0" smtClean="0">
                 <a:solidFill>
                   <a:srgbClr val="2A00FF"/>
                 </a:solidFill>
@@ -16841,7 +16841,31 @@
                 </a:highlight>
                 <a:latin typeface="Consolas"/>
               </a:rPr>
-              <a:t>"actor" </a:t>
+              <a:t>"</a:t>
+            </a:r>
+            <a:r>
+              <a:rPr lang="en-US" sz="800" i="1" dirty="0" err="1" smtClean="0">
+                <a:solidFill>
+                  <a:srgbClr val="2A00FF"/>
+                </a:solidFill>
+                <a:highlight>
+                  <a:srgbClr val="E8F2FE"/>
+                </a:highlight>
+                <a:latin typeface="Consolas"/>
+              </a:rPr>
+              <a:t>actorName</a:t>
+            </a:r>
+            <a:r>
+              <a:rPr lang="en-US" sz="800" i="1" dirty="0" smtClean="0">
+                <a:solidFill>
+                  <a:srgbClr val="2A00FF"/>
+                </a:solidFill>
+                <a:highlight>
+                  <a:srgbClr val="E8F2FE"/>
+                </a:highlight>
+                <a:latin typeface="Consolas"/>
+              </a:rPr>
+              <a:t>" </a:t>
             </a:r>
             <a:endParaRPr lang="en-US" sz="800" i="1" dirty="0" smtClean="0">
               <a:solidFill>
@@ -17128,13 +17152,13 @@
               <a:t>| </a:t>
             </a:r>
             <a:r>
-              <a:rPr lang="en-US" sz="700" i="1" dirty="0" err="1" smtClean="0">
+              <a:rPr lang="en-US" sz="700" i="1" smtClean="0">
                 <a:solidFill>
                   <a:srgbClr val="2A00FF"/>
                 </a:solidFill>
                 <a:latin typeface="Consolas"/>
               </a:rPr>
-              <a:t>actorSearch:actor</a:t>
+              <a:t>actorSearch:actorName </a:t>
             </a:r>
             <a:r>
               <a:rPr lang="en-US" sz="700" i="1" dirty="0" smtClean="0">
@@ -17143,7 +17167,7 @@
                 </a:solidFill>
                 <a:latin typeface="Consolas"/>
               </a:rPr>
-              <a:t> "</a:t>
+              <a:t>"</a:t>
             </a:r>
             <a:r>
               <a:rPr lang="en-US" sz="700" i="1" dirty="0" smtClean="0">
@@ -17154,12 +17178,6 @@
               </a:rPr>
               <a:t>&gt;</a:t>
             </a:r>
-            <a:endParaRPr lang="en-US" sz="700" i="1" dirty="0" smtClean="0">
-              <a:solidFill>
-                <a:srgbClr val="008080"/>
-              </a:solidFill>
-              <a:latin typeface="Consolas"/>
-            </a:endParaRPr>
           </a:p>
           <a:p>
             <a:endParaRPr lang="en-US" sz="700" i="1" dirty="0" smtClean="0">
@@ -17540,7 +17558,7 @@
                 <a:latin typeface="Courier New" panose="02070309020205020404" pitchFamily="49" charset="0"/>
                 <a:cs typeface="Courier New" panose="02070309020205020404" pitchFamily="49" charset="0"/>
               </a:rPr>
-              <a:t>actor</a:t>
+              <a:t>actorName</a:t>
             </a:r>
             <a:r>
               <a:rPr lang="fr-FR" sz="800" dirty="0" smtClean="0">
@@ -17560,25 +17578,8 @@
                 <a:latin typeface="Courier New" panose="02070309020205020404" pitchFamily="49" charset="0"/>
                 <a:cs typeface="Courier New" panose="02070309020205020404" pitchFamily="49" charset="0"/>
               </a:rPr>
-              <a:t>: </a:t>
-            </a:r>
-            <a:r>
-              <a:rPr lang="fr-FR" sz="800" dirty="0" smtClean="0">
-                <a:solidFill>
-                  <a:srgbClr val="A50021"/>
-                </a:solidFill>
-                <a:latin typeface="Courier New" panose="02070309020205020404" pitchFamily="49" charset="0"/>
-                <a:cs typeface="Courier New" panose="02070309020205020404" pitchFamily="49" charset="0"/>
-              </a:rPr>
-              <a:t>String</a:t>
-            </a:r>
-            <a:endParaRPr lang="fr-FR" sz="800" dirty="0" smtClean="0">
-              <a:solidFill>
-                <a:srgbClr val="A50021"/>
-              </a:solidFill>
-              <a:latin typeface="Courier New" panose="02070309020205020404" pitchFamily="49" charset="0"/>
-              <a:cs typeface="Courier New" panose="02070309020205020404" pitchFamily="49" charset="0"/>
-            </a:endParaRPr>
+              <a:t>: String</a:t>
+            </a:r>
           </a:p>
           <a:p>
             <a:endParaRPr lang="fr-FR" sz="800" dirty="0">

</xml_diff>